<commit_message>
Added second slide to the presentation
Also added .pdf copy
</commit_message>
<xml_diff>
--- a/emmetExprTree/src/LogicTreeTestPlan.pptx
+++ b/emmetExprTree/src/LogicTreeTestPlan.pptx
@@ -5,10 +5,11 @@
     <p:sldMasterId id="2147483648" r:id="rId1"/>
   </p:sldMasterIdLst>
   <p:notesMasterIdLst>
-    <p:notesMasterId r:id="rId3"/>
+    <p:notesMasterId r:id="rId4"/>
   </p:notesMasterIdLst>
   <p:sldIdLst>
     <p:sldId id="256" r:id="rId2"/>
+    <p:sldId id="257" r:id="rId3"/>
   </p:sldIdLst>
   <p:sldSz cx="12192000" cy="6858000"/>
   <p:notesSz cx="6858000" cy="9144000"/>
@@ -107,6 +108,11 @@
       </a:defRPr>
     </a:lvl9pPr>
   </p:defaultTextStyle>
+  <p:extLst>
+    <p:ext uri="{EFAFB233-063F-42B5-8137-9DF3F51BA10A}">
+      <p15:sldGuideLst xmlns:p15="http://schemas.microsoft.com/office/powerpoint/2012/main"/>
+    </p:ext>
+  </p:extLst>
 </p:presentation>
 </file>
 
@@ -3688,7 +3694,7 @@
           <p:nvPr>
             <p:extLst>
               <p:ext uri="{D42A27DB-BD31-4B8C-83A1-F6EECF244321}">
-                <p14:modId xmlns:p14="http://schemas.microsoft.com/office/powerpoint/2010/main" val="2822953513"/>
+                <p14:modId xmlns:p14="http://schemas.microsoft.com/office/powerpoint/2010/main" val="1099020431"/>
               </p:ext>
             </p:extLst>
           </p:nvPr>
@@ -3826,7 +3832,7 @@
                     <a:p>
                       <a:r>
                         <a:rPr lang="en-US" sz="2800" dirty="0"/>
-                        <a:t>True</a:t>
+                        <a:t>1</a:t>
                       </a:r>
                     </a:p>
                   </a:txBody>
@@ -3839,7 +3845,7 @@
                     <a:p>
                       <a:r>
                         <a:rPr lang="en-US" sz="2800" dirty="0"/>
-                        <a:t>Yes</a:t>
+                        <a:t>1</a:t>
                       </a:r>
                     </a:p>
                   </a:txBody>
@@ -3885,7 +3891,7 @@
                     <a:p>
                       <a:r>
                         <a:rPr lang="en-US" sz="2800" dirty="0"/>
-                        <a:t>True</a:t>
+                        <a:t>1</a:t>
                       </a:r>
                     </a:p>
                   </a:txBody>
@@ -3898,7 +3904,7 @@
                     <a:p>
                       <a:r>
                         <a:rPr lang="en-US" sz="2800" dirty="0"/>
-                        <a:t>Yes</a:t>
+                        <a:t>1</a:t>
                       </a:r>
                     </a:p>
                   </a:txBody>
@@ -3944,7 +3950,7 @@
                     <a:p>
                       <a:r>
                         <a:rPr lang="en-US" sz="2800" dirty="0"/>
-                        <a:t>True</a:t>
+                        <a:t>1</a:t>
                       </a:r>
                     </a:p>
                   </a:txBody>
@@ -3957,7 +3963,7 @@
                     <a:p>
                       <a:r>
                         <a:rPr lang="en-US" sz="2800" dirty="0"/>
-                        <a:t>Yes</a:t>
+                        <a:t>1</a:t>
                       </a:r>
                     </a:p>
                   </a:txBody>
@@ -4003,7 +4009,7 @@
                     <a:p>
                       <a:r>
                         <a:rPr lang="en-US" sz="2800" dirty="0"/>
-                        <a:t>False</a:t>
+                        <a:t>0</a:t>
                       </a:r>
                     </a:p>
                   </a:txBody>
@@ -4016,7 +4022,7 @@
                     <a:p>
                       <a:r>
                         <a:rPr lang="en-US" sz="2800" dirty="0"/>
-                        <a:t>Yes</a:t>
+                        <a:t>0</a:t>
                       </a:r>
                     </a:p>
                   </a:txBody>
@@ -4062,7 +4068,7 @@
                     <a:p>
                       <a:r>
                         <a:rPr lang="en-US" sz="2800" dirty="0"/>
-                        <a:t>True</a:t>
+                        <a:t>1</a:t>
                       </a:r>
                     </a:p>
                   </a:txBody>
@@ -4075,7 +4081,7 @@
                     <a:p>
                       <a:r>
                         <a:rPr lang="en-US" sz="2800" dirty="0"/>
-                        <a:t>Yes</a:t>
+                        <a:t>1</a:t>
                       </a:r>
                     </a:p>
                   </a:txBody>
@@ -4121,7 +4127,7 @@
                     <a:p>
                       <a:r>
                         <a:rPr lang="en-US" sz="2800" dirty="0"/>
-                        <a:t>True</a:t>
+                        <a:t>1</a:t>
                       </a:r>
                     </a:p>
                   </a:txBody>
@@ -4134,7 +4140,7 @@
                     <a:p>
                       <a:r>
                         <a:rPr lang="en-US" sz="2800" dirty="0"/>
-                        <a:t>Yes</a:t>
+                        <a:t>1</a:t>
                       </a:r>
                     </a:p>
                   </a:txBody>
@@ -4180,7 +4186,7 @@
                     <a:p>
                       <a:r>
                         <a:rPr lang="en-US" sz="2800" dirty="0"/>
-                        <a:t>True</a:t>
+                        <a:t>1</a:t>
                       </a:r>
                     </a:p>
                   </a:txBody>
@@ -4193,7 +4199,7 @@
                     <a:p>
                       <a:r>
                         <a:rPr lang="en-US" sz="2800" dirty="0"/>
-                        <a:t>Yes</a:t>
+                        <a:t>1</a:t>
                       </a:r>
                     </a:p>
                   </a:txBody>
@@ -4353,6 +4359,535 @@
     <p:extLst>
       <p:ext uri="{BB962C8B-B14F-4D97-AF65-F5344CB8AC3E}">
         <p14:creationId xmlns:p14="http://schemas.microsoft.com/office/powerpoint/2010/main" val="3759223477"/>
+      </p:ext>
+    </p:extLst>
+  </p:cSld>
+  <p:clrMapOvr>
+    <a:masterClrMapping/>
+  </p:clrMapOvr>
+</p:sld>
+</file>
+
+<file path=ppt/slides/slide2.xml><?xml version="1.0" encoding="utf-8"?>
+<p:sld xmlns:a="http://schemas.openxmlformats.org/drawingml/2006/main" xmlns:r="http://schemas.openxmlformats.org/officeDocument/2006/relationships" xmlns:p="http://schemas.openxmlformats.org/presentationml/2006/main">
+  <p:cSld>
+    <p:spTree>
+      <p:nvGrpSpPr>
+        <p:cNvPr id="1" name=""/>
+        <p:cNvGrpSpPr/>
+        <p:nvPr/>
+      </p:nvGrpSpPr>
+      <p:grpSpPr>
+        <a:xfrm>
+          <a:off x="0" y="0"/>
+          <a:ext cx="0" cy="0"/>
+          <a:chOff x="0" y="0"/>
+          <a:chExt cx="0" cy="0"/>
+        </a:xfrm>
+      </p:grpSpPr>
+      <p:sp>
+        <p:nvSpPr>
+          <p:cNvPr id="4" name="TextBox 3">
+            <a:extLst>
+              <a:ext uri="{FF2B5EF4-FFF2-40B4-BE49-F238E27FC236}">
+                <a16:creationId xmlns:a16="http://schemas.microsoft.com/office/drawing/2014/main" id="{CE9B327C-6F0E-467C-B068-DC67C2D9102B}"/>
+              </a:ext>
+            </a:extLst>
+          </p:cNvPr>
+          <p:cNvSpPr txBox="1"/>
+          <p:nvPr/>
+        </p:nvSpPr>
+        <p:spPr>
+          <a:xfrm>
+            <a:off x="124944" y="77543"/>
+            <a:ext cx="1812932" cy="369332"/>
+          </a:xfrm>
+          <a:prstGeom prst="rect">
+            <a:avLst/>
+          </a:prstGeom>
+          <a:noFill/>
+        </p:spPr>
+        <p:txBody>
+          <a:bodyPr wrap="none" rtlCol="0">
+            <a:spAutoFit/>
+          </a:bodyPr>
+          <a:lstStyle/>
+          <a:p>
+            <a:r>
+              <a:rPr lang="en-US" dirty="0"/>
+              <a:t>Emmet Stanevich</a:t>
+            </a:r>
+          </a:p>
+        </p:txBody>
+      </p:sp>
+      <p:sp>
+        <p:nvSpPr>
+          <p:cNvPr id="5" name="TextBox 4">
+            <a:extLst>
+              <a:ext uri="{FF2B5EF4-FFF2-40B4-BE49-F238E27FC236}">
+                <a16:creationId xmlns:a16="http://schemas.microsoft.com/office/drawing/2014/main" id="{C098B311-66CA-4D0A-95F3-5E1E2E406268}"/>
+              </a:ext>
+            </a:extLst>
+          </p:cNvPr>
+          <p:cNvSpPr txBox="1"/>
+          <p:nvPr/>
+        </p:nvSpPr>
+        <p:spPr>
+          <a:xfrm>
+            <a:off x="3468571" y="77543"/>
+            <a:ext cx="1091517" cy="369332"/>
+          </a:xfrm>
+          <a:prstGeom prst="rect">
+            <a:avLst/>
+          </a:prstGeom>
+          <a:noFill/>
+        </p:spPr>
+        <p:txBody>
+          <a:bodyPr wrap="none" rtlCol="0">
+            <a:spAutoFit/>
+          </a:bodyPr>
+          <a:lstStyle/>
+          <a:p>
+            <a:r>
+              <a:rPr lang="en-US" dirty="0"/>
+              <a:t>COSC 311</a:t>
+            </a:r>
+          </a:p>
+        </p:txBody>
+      </p:sp>
+      <p:sp>
+        <p:nvSpPr>
+          <p:cNvPr id="6" name="TextBox 5">
+            <a:extLst>
+              <a:ext uri="{FF2B5EF4-FFF2-40B4-BE49-F238E27FC236}">
+                <a16:creationId xmlns:a16="http://schemas.microsoft.com/office/drawing/2014/main" id="{A18C5740-92AC-471B-A002-A680266908A7}"/>
+              </a:ext>
+            </a:extLst>
+          </p:cNvPr>
+          <p:cNvSpPr txBox="1"/>
+          <p:nvPr/>
+        </p:nvSpPr>
+        <p:spPr>
+          <a:xfrm>
+            <a:off x="11117757" y="77543"/>
+            <a:ext cx="949299" cy="369332"/>
+          </a:xfrm>
+          <a:prstGeom prst="rect">
+            <a:avLst/>
+          </a:prstGeom>
+          <a:noFill/>
+        </p:spPr>
+        <p:txBody>
+          <a:bodyPr wrap="none" rtlCol="0">
+            <a:spAutoFit/>
+          </a:bodyPr>
+          <a:lstStyle/>
+          <a:p>
+            <a:r>
+              <a:rPr lang="en-US" dirty="0"/>
+              <a:t>3/28/19</a:t>
+            </a:r>
+          </a:p>
+        </p:txBody>
+      </p:sp>
+      <p:sp>
+        <p:nvSpPr>
+          <p:cNvPr id="7" name="TextBox 6">
+            <a:extLst>
+              <a:ext uri="{FF2B5EF4-FFF2-40B4-BE49-F238E27FC236}">
+                <a16:creationId xmlns:a16="http://schemas.microsoft.com/office/drawing/2014/main" id="{5276B8E9-4A04-41B6-BAF4-BD8B5ECDC4FA}"/>
+              </a:ext>
+            </a:extLst>
+          </p:cNvPr>
+          <p:cNvSpPr txBox="1"/>
+          <p:nvPr/>
+        </p:nvSpPr>
+        <p:spPr>
+          <a:xfrm>
+            <a:off x="5526929" y="77543"/>
+            <a:ext cx="1122743" cy="369332"/>
+          </a:xfrm>
+          <a:prstGeom prst="rect">
+            <a:avLst/>
+          </a:prstGeom>
+          <a:noFill/>
+        </p:spPr>
+        <p:txBody>
+          <a:bodyPr wrap="none" rtlCol="0">
+            <a:spAutoFit/>
+          </a:bodyPr>
+          <a:lstStyle/>
+          <a:p>
+            <a:r>
+              <a:rPr lang="en-US" dirty="0"/>
+              <a:t>Logic Tree</a:t>
+            </a:r>
+          </a:p>
+        </p:txBody>
+      </p:sp>
+      <p:graphicFrame>
+        <p:nvGraphicFramePr>
+          <p:cNvPr id="8" name="Table 7">
+            <a:extLst>
+              <a:ext uri="{FF2B5EF4-FFF2-40B4-BE49-F238E27FC236}">
+                <a16:creationId xmlns:a16="http://schemas.microsoft.com/office/drawing/2014/main" id="{89C3012C-6925-4917-8943-5E22F21E1545}"/>
+              </a:ext>
+            </a:extLst>
+          </p:cNvPr>
+          <p:cNvGraphicFramePr>
+            <a:graphicFrameLocks noGrp="1"/>
+          </p:cNvGraphicFramePr>
+          <p:nvPr>
+            <p:extLst>
+              <p:ext uri="{D42A27DB-BD31-4B8C-83A1-F6EECF244321}">
+                <p14:modId xmlns:p14="http://schemas.microsoft.com/office/powerpoint/2010/main" val="1683396914"/>
+              </p:ext>
+            </p:extLst>
+          </p:nvPr>
+        </p:nvGraphicFramePr>
+        <p:xfrm>
+          <a:off x="-6422" y="837112"/>
+          <a:ext cx="12198420" cy="6004910"/>
+        </p:xfrm>
+        <a:graphic>
+          <a:graphicData uri="http://schemas.openxmlformats.org/drawingml/2006/table">
+            <a:tbl>
+              <a:tblPr firstRow="1" bandRow="1">
+                <a:tableStyleId>{5C22544A-7EE6-4342-B048-85BDC9FD1C3A}</a:tableStyleId>
+              </a:tblPr>
+              <a:tblGrid>
+                <a:gridCol w="1207873">
+                  <a:extLst>
+                    <a:ext uri="{9D8B030D-6E8A-4147-A177-3AD203B41FA5}">
+                      <a16:colId xmlns:a16="http://schemas.microsoft.com/office/drawing/2014/main" val="2055104018"/>
+                    </a:ext>
+                  </a:extLst>
+                </a:gridCol>
+                <a:gridCol w="1237253">
+                  <a:extLst>
+                    <a:ext uri="{9D8B030D-6E8A-4147-A177-3AD203B41FA5}">
+                      <a16:colId xmlns:a16="http://schemas.microsoft.com/office/drawing/2014/main" val="1012534028"/>
+                    </a:ext>
+                  </a:extLst>
+                </a:gridCol>
+                <a:gridCol w="3939377">
+                  <a:extLst>
+                    <a:ext uri="{9D8B030D-6E8A-4147-A177-3AD203B41FA5}">
+                      <a16:colId xmlns:a16="http://schemas.microsoft.com/office/drawing/2014/main" val="1376428798"/>
+                    </a:ext>
+                  </a:extLst>
+                </a:gridCol>
+                <a:gridCol w="5813917">
+                  <a:extLst>
+                    <a:ext uri="{9D8B030D-6E8A-4147-A177-3AD203B41FA5}">
+                      <a16:colId xmlns:a16="http://schemas.microsoft.com/office/drawing/2014/main" val="232427678"/>
+                    </a:ext>
+                  </a:extLst>
+                </a:gridCol>
+              </a:tblGrid>
+              <a:tr h="1200982">
+                <a:tc>
+                  <a:txBody>
+                    <a:bodyPr/>
+                    <a:lstStyle/>
+                    <a:p>
+                      <a:r>
+                        <a:rPr lang="en-US" sz="5800" dirty="0"/>
+                        <a:t>X</a:t>
+                      </a:r>
+                    </a:p>
+                  </a:txBody>
+                  <a:tcPr marL="296132" marR="296132" marT="148067" marB="148067"/>
+                </a:tc>
+                <a:tc>
+                  <a:txBody>
+                    <a:bodyPr/>
+                    <a:lstStyle/>
+                    <a:p>
+                      <a:r>
+                        <a:rPr lang="en-US" sz="5800" dirty="0"/>
+                        <a:t>Y</a:t>
+                      </a:r>
+                    </a:p>
+                  </a:txBody>
+                  <a:tcPr marL="296132" marR="296132" marT="148067" marB="148067"/>
+                </a:tc>
+                <a:tc>
+                  <a:txBody>
+                    <a:bodyPr/>
+                    <a:lstStyle/>
+                    <a:p>
+                      <a:r>
+                        <a:rPr lang="en-US" sz="5800" dirty="0"/>
+                        <a:t>C=*XY</a:t>
+                      </a:r>
+                    </a:p>
+                  </a:txBody>
+                  <a:tcPr marL="296132" marR="296132" marT="148067" marB="148067"/>
+                </a:tc>
+                <a:tc>
+                  <a:txBody>
+                    <a:bodyPr/>
+                    <a:lstStyle/>
+                    <a:p>
+                      <a:r>
+                        <a:rPr lang="en-US" sz="5800" dirty="0"/>
+                        <a:t>S=+*X-Y*-XY</a:t>
+                      </a:r>
+                    </a:p>
+                  </a:txBody>
+                  <a:tcPr marL="296132" marR="296132" marT="148067" marB="148067"/>
+                </a:tc>
+                <a:extLst>
+                  <a:ext uri="{0D108BD9-81ED-4DB2-BD59-A6C34878D82A}">
+                    <a16:rowId xmlns:a16="http://schemas.microsoft.com/office/drawing/2014/main" val="2243417749"/>
+                  </a:ext>
+                </a:extLst>
+              </a:tr>
+              <a:tr h="1200982">
+                <a:tc>
+                  <a:txBody>
+                    <a:bodyPr/>
+                    <a:lstStyle/>
+                    <a:p>
+                      <a:r>
+                        <a:rPr lang="en-US" sz="5800" dirty="0"/>
+                        <a:t>0</a:t>
+                      </a:r>
+                    </a:p>
+                  </a:txBody>
+                  <a:tcPr marL="296132" marR="296132" marT="148067" marB="148067"/>
+                </a:tc>
+                <a:tc>
+                  <a:txBody>
+                    <a:bodyPr/>
+                    <a:lstStyle/>
+                    <a:p>
+                      <a:r>
+                        <a:rPr lang="en-US" sz="5800" dirty="0"/>
+                        <a:t>0</a:t>
+                      </a:r>
+                    </a:p>
+                  </a:txBody>
+                  <a:tcPr marL="296132" marR="296132" marT="148067" marB="148067"/>
+                </a:tc>
+                <a:tc>
+                  <a:txBody>
+                    <a:bodyPr/>
+                    <a:lstStyle/>
+                    <a:p>
+                      <a:r>
+                        <a:rPr lang="en-US" sz="5800" dirty="0"/>
+                        <a:t>*00=0</a:t>
+                      </a:r>
+                    </a:p>
+                  </a:txBody>
+                  <a:tcPr marL="296132" marR="296132" marT="148067" marB="148067"/>
+                </a:tc>
+                <a:tc>
+                  <a:txBody>
+                    <a:bodyPr/>
+                    <a:lstStyle/>
+                    <a:p>
+                      <a:r>
+                        <a:rPr lang="en-US" sz="5800" dirty="0"/>
+                        <a:t>+*0-0*-00=0</a:t>
+                      </a:r>
+                    </a:p>
+                  </a:txBody>
+                  <a:tcPr marL="296132" marR="296132" marT="148067" marB="148067"/>
+                </a:tc>
+                <a:extLst>
+                  <a:ext uri="{0D108BD9-81ED-4DB2-BD59-A6C34878D82A}">
+                    <a16:rowId xmlns:a16="http://schemas.microsoft.com/office/drawing/2014/main" val="186565535"/>
+                  </a:ext>
+                </a:extLst>
+              </a:tr>
+              <a:tr h="1200982">
+                <a:tc>
+                  <a:txBody>
+                    <a:bodyPr/>
+                    <a:lstStyle/>
+                    <a:p>
+                      <a:r>
+                        <a:rPr lang="en-US" sz="5800" dirty="0"/>
+                        <a:t>0</a:t>
+                      </a:r>
+                    </a:p>
+                  </a:txBody>
+                  <a:tcPr marL="296132" marR="296132" marT="148067" marB="148067"/>
+                </a:tc>
+                <a:tc>
+                  <a:txBody>
+                    <a:bodyPr/>
+                    <a:lstStyle/>
+                    <a:p>
+                      <a:r>
+                        <a:rPr lang="en-US" sz="5800" dirty="0"/>
+                        <a:t>1</a:t>
+                      </a:r>
+                    </a:p>
+                  </a:txBody>
+                  <a:tcPr marL="296132" marR="296132" marT="148067" marB="148067"/>
+                </a:tc>
+                <a:tc>
+                  <a:txBody>
+                    <a:bodyPr/>
+                    <a:lstStyle/>
+                    <a:p>
+                      <a:r>
+                        <a:rPr lang="en-US" sz="5800" dirty="0"/>
+                        <a:t>*01=0</a:t>
+                      </a:r>
+                    </a:p>
+                  </a:txBody>
+                  <a:tcPr marL="296132" marR="296132" marT="148067" marB="148067"/>
+                </a:tc>
+                <a:tc>
+                  <a:txBody>
+                    <a:bodyPr/>
+                    <a:lstStyle/>
+                    <a:p>
+                      <a:r>
+                        <a:rPr lang="en-US" sz="5800" dirty="0"/>
+                        <a:t>+*0-1*-01=1</a:t>
+                      </a:r>
+                    </a:p>
+                  </a:txBody>
+                  <a:tcPr marL="296132" marR="296132" marT="148067" marB="148067"/>
+                </a:tc>
+                <a:extLst>
+                  <a:ext uri="{0D108BD9-81ED-4DB2-BD59-A6C34878D82A}">
+                    <a16:rowId xmlns:a16="http://schemas.microsoft.com/office/drawing/2014/main" val="4079819513"/>
+                  </a:ext>
+                </a:extLst>
+              </a:tr>
+              <a:tr h="1200982">
+                <a:tc>
+                  <a:txBody>
+                    <a:bodyPr/>
+                    <a:lstStyle/>
+                    <a:p>
+                      <a:r>
+                        <a:rPr lang="en-US" sz="5800" dirty="0"/>
+                        <a:t>1</a:t>
+                      </a:r>
+                    </a:p>
+                  </a:txBody>
+                  <a:tcPr marL="296132" marR="296132" marT="148067" marB="148067"/>
+                </a:tc>
+                <a:tc>
+                  <a:txBody>
+                    <a:bodyPr/>
+                    <a:lstStyle/>
+                    <a:p>
+                      <a:r>
+                        <a:rPr lang="en-US" sz="5800" dirty="0"/>
+                        <a:t>0</a:t>
+                      </a:r>
+                    </a:p>
+                  </a:txBody>
+                  <a:tcPr marL="296132" marR="296132" marT="148067" marB="148067"/>
+                </a:tc>
+                <a:tc>
+                  <a:txBody>
+                    <a:bodyPr/>
+                    <a:lstStyle/>
+                    <a:p>
+                      <a:r>
+                        <a:rPr lang="en-US" sz="5800" dirty="0"/>
+                        <a:t>*10=0</a:t>
+                      </a:r>
+                    </a:p>
+                  </a:txBody>
+                  <a:tcPr marL="296132" marR="296132" marT="148067" marB="148067"/>
+                </a:tc>
+                <a:tc>
+                  <a:txBody>
+                    <a:bodyPr/>
+                    <a:lstStyle/>
+                    <a:p>
+                      <a:r>
+                        <a:rPr lang="en-US" sz="5800" dirty="0"/>
+                        <a:t>+*1-0*-10=1</a:t>
+                      </a:r>
+                    </a:p>
+                  </a:txBody>
+                  <a:tcPr marL="296132" marR="296132" marT="148067" marB="148067"/>
+                </a:tc>
+                <a:extLst>
+                  <a:ext uri="{0D108BD9-81ED-4DB2-BD59-A6C34878D82A}">
+                    <a16:rowId xmlns:a16="http://schemas.microsoft.com/office/drawing/2014/main" val="320766350"/>
+                  </a:ext>
+                </a:extLst>
+              </a:tr>
+              <a:tr h="1200982">
+                <a:tc>
+                  <a:txBody>
+                    <a:bodyPr/>
+                    <a:lstStyle/>
+                    <a:p>
+                      <a:r>
+                        <a:rPr lang="en-US" sz="5800" dirty="0"/>
+                        <a:t>1</a:t>
+                      </a:r>
+                    </a:p>
+                  </a:txBody>
+                  <a:tcPr marL="296132" marR="296132" marT="148067" marB="148067"/>
+                </a:tc>
+                <a:tc>
+                  <a:txBody>
+                    <a:bodyPr/>
+                    <a:lstStyle/>
+                    <a:p>
+                      <a:r>
+                        <a:rPr lang="en-US" sz="5800" dirty="0"/>
+                        <a:t>1</a:t>
+                      </a:r>
+                    </a:p>
+                  </a:txBody>
+                  <a:tcPr marL="296132" marR="296132" marT="148067" marB="148067"/>
+                </a:tc>
+                <a:tc>
+                  <a:txBody>
+                    <a:bodyPr/>
+                    <a:lstStyle/>
+                    <a:p>
+                      <a:r>
+                        <a:rPr lang="en-US" sz="5800" dirty="0"/>
+                        <a:t>*11=1</a:t>
+                      </a:r>
+                    </a:p>
+                  </a:txBody>
+                  <a:tcPr marL="296132" marR="296132" marT="148067" marB="148067"/>
+                </a:tc>
+                <a:tc>
+                  <a:txBody>
+                    <a:bodyPr/>
+                    <a:lstStyle/>
+                    <a:p>
+                      <a:r>
+                        <a:rPr lang="en-US" sz="5800" dirty="0"/>
+                        <a:t>+*1-1*-11=0</a:t>
+                      </a:r>
+                    </a:p>
+                  </a:txBody>
+                  <a:tcPr marL="296132" marR="296132" marT="148067" marB="148067"/>
+                </a:tc>
+                <a:extLst>
+                  <a:ext uri="{0D108BD9-81ED-4DB2-BD59-A6C34878D82A}">
+                    <a16:rowId xmlns:a16="http://schemas.microsoft.com/office/drawing/2014/main" val="1134486571"/>
+                  </a:ext>
+                </a:extLst>
+              </a:tr>
+            </a:tbl>
+          </a:graphicData>
+        </a:graphic>
+      </p:graphicFrame>
+    </p:spTree>
+    <p:extLst>
+      <p:ext uri="{BB962C8B-B14F-4D97-AF65-F5344CB8AC3E}">
+        <p14:creationId xmlns:p14="http://schemas.microsoft.com/office/powerpoint/2010/main" val="3011293031"/>
       </p:ext>
     </p:extLst>
   </p:cSld>

</xml_diff>